<commit_message>
day 5 ms oauth
</commit_message>
<xml_diff>
--- a/ppt/100_Microservices.pptx
+++ b/ppt/100_Microservices.pptx
@@ -198,7 +198,7 @@
           <a:p>
             <a:fld id="{C3031CBD-A6E9-1A4A-9F95-3E0236AD39C8}" type="datetimeFigureOut">
               <a:rPr lang="en-US" smtClean="0"/>
-              <a:t>10/6/22</a:t>
+              <a:t>3/17/23</a:t>
             </a:fld>
             <a:endParaRPr lang="en-US"/>
           </a:p>
@@ -678,7 +678,7 @@
           <a:p>
             <a:fld id="{7E6D1355-7464-EB4A-BF2B-3D825BF4D554}" type="datetimeFigureOut">
               <a:rPr lang="en-US" smtClean="0"/>
-              <a:t>10/6/22</a:t>
+              <a:t>3/17/23</a:t>
             </a:fld>
             <a:endParaRPr lang="en-US"/>
           </a:p>
@@ -846,7 +846,7 @@
           <a:p>
             <a:fld id="{7E6D1355-7464-EB4A-BF2B-3D825BF4D554}" type="datetimeFigureOut">
               <a:rPr lang="en-US" smtClean="0"/>
-              <a:t>10/6/22</a:t>
+              <a:t>3/17/23</a:t>
             </a:fld>
             <a:endParaRPr lang="en-US"/>
           </a:p>
@@ -1024,7 +1024,7 @@
           <a:p>
             <a:fld id="{7E6D1355-7464-EB4A-BF2B-3D825BF4D554}" type="datetimeFigureOut">
               <a:rPr lang="en-US" smtClean="0"/>
-              <a:t>10/6/22</a:t>
+              <a:t>3/17/23</a:t>
             </a:fld>
             <a:endParaRPr lang="en-US"/>
           </a:p>
@@ -1192,7 +1192,7 @@
           <a:p>
             <a:fld id="{7E6D1355-7464-EB4A-BF2B-3D825BF4D554}" type="datetimeFigureOut">
               <a:rPr lang="en-US" smtClean="0"/>
-              <a:t>10/6/22</a:t>
+              <a:t>3/17/23</a:t>
             </a:fld>
             <a:endParaRPr lang="en-US"/>
           </a:p>
@@ -1437,7 +1437,7 @@
           <a:p>
             <a:fld id="{7E6D1355-7464-EB4A-BF2B-3D825BF4D554}" type="datetimeFigureOut">
               <a:rPr lang="en-US" smtClean="0"/>
-              <a:t>10/6/22</a:t>
+              <a:t>3/17/23</a:t>
             </a:fld>
             <a:endParaRPr lang="en-US"/>
           </a:p>
@@ -1666,7 +1666,7 @@
           <a:p>
             <a:fld id="{7E6D1355-7464-EB4A-BF2B-3D825BF4D554}" type="datetimeFigureOut">
               <a:rPr lang="en-US" smtClean="0"/>
-              <a:t>10/6/22</a:t>
+              <a:t>3/17/23</a:t>
             </a:fld>
             <a:endParaRPr lang="en-US"/>
           </a:p>
@@ -2030,7 +2030,7 @@
           <a:p>
             <a:fld id="{7E6D1355-7464-EB4A-BF2B-3D825BF4D554}" type="datetimeFigureOut">
               <a:rPr lang="en-US" smtClean="0"/>
-              <a:t>10/6/22</a:t>
+              <a:t>3/17/23</a:t>
             </a:fld>
             <a:endParaRPr lang="en-US"/>
           </a:p>
@@ -2147,7 +2147,7 @@
           <a:p>
             <a:fld id="{7E6D1355-7464-EB4A-BF2B-3D825BF4D554}" type="datetimeFigureOut">
               <a:rPr lang="en-US" smtClean="0"/>
-              <a:t>10/6/22</a:t>
+              <a:t>3/17/23</a:t>
             </a:fld>
             <a:endParaRPr lang="en-US"/>
           </a:p>
@@ -2242,7 +2242,7 @@
           <a:p>
             <a:fld id="{7E6D1355-7464-EB4A-BF2B-3D825BF4D554}" type="datetimeFigureOut">
               <a:rPr lang="en-US" smtClean="0"/>
-              <a:t>10/6/22</a:t>
+              <a:t>3/17/23</a:t>
             </a:fld>
             <a:endParaRPr lang="en-US"/>
           </a:p>
@@ -2517,7 +2517,7 @@
           <a:p>
             <a:fld id="{7E6D1355-7464-EB4A-BF2B-3D825BF4D554}" type="datetimeFigureOut">
               <a:rPr lang="en-US" smtClean="0"/>
-              <a:t>10/6/22</a:t>
+              <a:t>3/17/23</a:t>
             </a:fld>
             <a:endParaRPr lang="en-US"/>
           </a:p>
@@ -2769,7 +2769,7 @@
           <a:p>
             <a:fld id="{7E6D1355-7464-EB4A-BF2B-3D825BF4D554}" type="datetimeFigureOut">
               <a:rPr lang="en-US" smtClean="0"/>
-              <a:t>10/6/22</a:t>
+              <a:t>3/17/23</a:t>
             </a:fld>
             <a:endParaRPr lang="en-US"/>
           </a:p>
@@ -2980,7 +2980,7 @@
           <a:p>
             <a:fld id="{7E6D1355-7464-EB4A-BF2B-3D825BF4D554}" type="datetimeFigureOut">
               <a:rPr lang="en-US" smtClean="0"/>
-              <a:t>10/6/22</a:t>
+              <a:t>3/17/23</a:t>
             </a:fld>
             <a:endParaRPr lang="en-US"/>
           </a:p>
@@ -3554,7 +3554,7 @@
         </p:nvSpPr>
         <p:spPr>
           <a:xfrm>
-            <a:off x="4804229" y="1270000"/>
+            <a:off x="4790625" y="1084166"/>
             <a:ext cx="2989942" cy="638629"/>
           </a:xfrm>
           <a:prstGeom prst="rect">
@@ -3595,7 +3595,7 @@
         </p:nvSpPr>
         <p:spPr>
           <a:xfrm>
-            <a:off x="9318171" y="725714"/>
+            <a:off x="9693665" y="311177"/>
             <a:ext cx="2159126" cy="638629"/>
           </a:xfrm>
           <a:prstGeom prst="rect">
@@ -3938,7 +3938,7 @@
         </p:nvSpPr>
         <p:spPr>
           <a:xfrm>
-            <a:off x="4786086" y="2263501"/>
+            <a:off x="4788528" y="2392432"/>
             <a:ext cx="2989942" cy="638629"/>
           </a:xfrm>
           <a:prstGeom prst="rect">
@@ -3979,7 +3979,7 @@
         </p:nvSpPr>
         <p:spPr>
           <a:xfrm>
-            <a:off x="9332686" y="1779813"/>
+            <a:off x="9728074" y="1164830"/>
             <a:ext cx="2159126" cy="638629"/>
           </a:xfrm>
           <a:prstGeom prst="rect">
@@ -4028,7 +4028,7 @@
         </p:nvSpPr>
         <p:spPr>
           <a:xfrm>
-            <a:off x="304800" y="1380671"/>
+            <a:off x="304800" y="537662"/>
             <a:ext cx="1349828" cy="1055916"/>
           </a:xfrm>
           <a:prstGeom prst="rect">
@@ -4199,7 +4199,7 @@
         </p:nvSpPr>
         <p:spPr>
           <a:xfrm>
-            <a:off x="693683" y="5801710"/>
+            <a:off x="622245" y="5987996"/>
             <a:ext cx="504496" cy="599090"/>
           </a:xfrm>
           <a:prstGeom prst="can">
@@ -4239,7 +4239,7 @@
         </p:nvSpPr>
         <p:spPr>
           <a:xfrm>
-            <a:off x="2522983" y="5801710"/>
+            <a:off x="2451545" y="5987996"/>
             <a:ext cx="504496" cy="599090"/>
           </a:xfrm>
           <a:prstGeom prst="can">
@@ -4279,7 +4279,7 @@
         </p:nvSpPr>
         <p:spPr>
           <a:xfrm>
-            <a:off x="4428609" y="5801710"/>
+            <a:off x="4357171" y="5987996"/>
             <a:ext cx="504496" cy="599090"/>
           </a:xfrm>
           <a:prstGeom prst="can">
@@ -4319,7 +4319,7 @@
         </p:nvSpPr>
         <p:spPr>
           <a:xfrm>
-            <a:off x="6547695" y="5746030"/>
+            <a:off x="6476257" y="5932316"/>
             <a:ext cx="504496" cy="599090"/>
           </a:xfrm>
           <a:prstGeom prst="can">
@@ -4359,7 +4359,7 @@
         </p:nvSpPr>
         <p:spPr>
           <a:xfrm>
-            <a:off x="8376995" y="5746030"/>
+            <a:off x="8305557" y="5932316"/>
             <a:ext cx="504496" cy="599090"/>
           </a:xfrm>
           <a:prstGeom prst="can">
@@ -4399,7 +4399,7 @@
         </p:nvSpPr>
         <p:spPr>
           <a:xfrm>
-            <a:off x="10508837" y="5746030"/>
+            <a:off x="10437399" y="5932316"/>
             <a:ext cx="504496" cy="599090"/>
           </a:xfrm>
           <a:prstGeom prst="can">
@@ -4442,8 +4442,8 @@
         </p:nvCxnSpPr>
         <p:spPr>
           <a:xfrm flipV="1">
-            <a:off x="979714" y="2436587"/>
-            <a:ext cx="0" cy="1674583"/>
+            <a:off x="979714" y="1593578"/>
+            <a:ext cx="0" cy="2517592"/>
           </a:xfrm>
           <a:prstGeom prst="straightConnector1">
             <a:avLst/>
@@ -4471,14 +4471,16 @@
         <p:nvCxnSpPr>
           <p:cNvPr id="33" name="Straight Arrow Connector 32"/>
           <p:cNvCxnSpPr>
+            <a:cxnSpLocks/>
             <a:stCxn id="12" idx="2"/>
+            <a:endCxn id="2" idx="1"/>
           </p:cNvCxnSpPr>
           <p:nvPr/>
         </p:nvCxnSpPr>
         <p:spPr>
-          <a:xfrm>
-            <a:off x="979714" y="5167086"/>
-            <a:ext cx="0" cy="634624"/>
+          <a:xfrm flipH="1">
+            <a:off x="874493" y="5167086"/>
+            <a:ext cx="105221" cy="820910"/>
           </a:xfrm>
           <a:prstGeom prst="straightConnector1">
             <a:avLst/>
@@ -4677,7 +4679,7 @@
         </p:nvCxnSpPr>
         <p:spPr>
           <a:xfrm>
-            <a:off x="6273425" y="725714"/>
+            <a:off x="6259821" y="539880"/>
             <a:ext cx="25775" cy="544286"/>
           </a:xfrm>
           <a:prstGeom prst="straightConnector1">
@@ -4712,7 +4714,7 @@
         </p:nvCxnSpPr>
         <p:spPr>
           <a:xfrm>
-            <a:off x="6244897" y="1918438"/>
+            <a:off x="6247339" y="2047369"/>
             <a:ext cx="36160" cy="345063"/>
           </a:xfrm>
           <a:prstGeom prst="straightConnector1">
@@ -4748,8 +4750,8 @@
         </p:nvCxnSpPr>
         <p:spPr>
           <a:xfrm flipH="1">
-            <a:off x="3229428" y="2582816"/>
-            <a:ext cx="1556658" cy="363584"/>
+            <a:off x="3229428" y="2711747"/>
+            <a:ext cx="1559100" cy="234653"/>
           </a:xfrm>
           <a:prstGeom prst="straightConnector1">
             <a:avLst/>
@@ -4783,7 +4785,7 @@
         </p:nvCxnSpPr>
         <p:spPr>
           <a:xfrm flipH="1">
-            <a:off x="3027480" y="2582816"/>
+            <a:off x="3029922" y="2711747"/>
             <a:ext cx="1758606" cy="1484084"/>
           </a:xfrm>
           <a:prstGeom prst="straightConnector1">
@@ -5024,7 +5026,7 @@
         </p:nvCxnSpPr>
         <p:spPr>
           <a:xfrm flipH="1">
-            <a:off x="7823201" y="1045029"/>
+            <a:off x="8198695" y="630492"/>
             <a:ext cx="1494970" cy="514452"/>
           </a:xfrm>
           <a:prstGeom prst="straightConnector1">
@@ -5059,7 +5061,7 @@
         </p:nvCxnSpPr>
         <p:spPr>
           <a:xfrm>
-            <a:off x="7823200" y="1772061"/>
+            <a:off x="8218588" y="1157078"/>
             <a:ext cx="1509486" cy="327067"/>
           </a:xfrm>
           <a:prstGeom prst="straightConnector1">
@@ -5094,7 +5096,7 @@
         </p:nvCxnSpPr>
         <p:spPr>
           <a:xfrm flipH="1">
-            <a:off x="5218386" y="2099128"/>
+            <a:off x="5613774" y="1484145"/>
             <a:ext cx="4114300" cy="2081898"/>
           </a:xfrm>
           <a:prstGeom prst="straightConnector1">
@@ -5193,7 +5195,7 @@
         </p:nvSpPr>
         <p:spPr>
           <a:xfrm>
-            <a:off x="3431377" y="5746030"/>
+            <a:off x="3359939" y="5932316"/>
             <a:ext cx="777929" cy="654770"/>
           </a:xfrm>
           <a:prstGeom prst="cloud">
@@ -5562,6 +5564,150 @@
           </a:fontRef>
         </p:style>
       </p:cxnSp>
+      <p:sp>
+        <p:nvSpPr>
+          <p:cNvPr id="3" name="Rectangle 2">
+            <a:extLst>
+              <a:ext uri="{FF2B5EF4-FFF2-40B4-BE49-F238E27FC236}">
+                <a16:creationId xmlns:a16="http://schemas.microsoft.com/office/drawing/2014/main" id="{5468BC30-2323-7AFD-19CF-BDACF7465B06}"/>
+              </a:ext>
+            </a:extLst>
+          </p:cNvPr>
+          <p:cNvSpPr/>
+          <p:nvPr/>
+        </p:nvSpPr>
+        <p:spPr>
+          <a:xfrm>
+            <a:off x="304800" y="5334783"/>
+            <a:ext cx="11193518" cy="450970"/>
+          </a:xfrm>
+          <a:prstGeom prst="rect">
+            <a:avLst/>
+          </a:prstGeom>
+        </p:spPr>
+        <p:style>
+          <a:lnRef idx="1">
+            <a:schemeClr val="accent2"/>
+          </a:lnRef>
+          <a:fillRef idx="3">
+            <a:schemeClr val="accent2"/>
+          </a:fillRef>
+          <a:effectRef idx="2">
+            <a:schemeClr val="accent2"/>
+          </a:effectRef>
+          <a:fontRef idx="minor">
+            <a:schemeClr val="lt1"/>
+          </a:fontRef>
+        </p:style>
+        <p:txBody>
+          <a:bodyPr rtlCol="0" anchor="ctr"/>
+          <a:lstStyle/>
+          <a:p>
+            <a:pPr algn="ctr"/>
+            <a:r>
+              <a:rPr lang="en-US" dirty="0"/>
+              <a:t>CIRCUIT BREAKER</a:t>
+            </a:r>
+          </a:p>
+        </p:txBody>
+      </p:sp>
+      <p:sp>
+        <p:nvSpPr>
+          <p:cNvPr id="25" name="Rectangle 24">
+            <a:extLst>
+              <a:ext uri="{FF2B5EF4-FFF2-40B4-BE49-F238E27FC236}">
+                <a16:creationId xmlns:a16="http://schemas.microsoft.com/office/drawing/2014/main" id="{8EB0A754-03F3-F852-52C7-7D4B764070C6}"/>
+              </a:ext>
+            </a:extLst>
+          </p:cNvPr>
+          <p:cNvSpPr/>
+          <p:nvPr/>
+        </p:nvSpPr>
+        <p:spPr>
+          <a:xfrm>
+            <a:off x="304800" y="1843366"/>
+            <a:ext cx="11193518" cy="450970"/>
+          </a:xfrm>
+          <a:prstGeom prst="rect">
+            <a:avLst/>
+          </a:prstGeom>
+        </p:spPr>
+        <p:style>
+          <a:lnRef idx="1">
+            <a:schemeClr val="accent2"/>
+          </a:lnRef>
+          <a:fillRef idx="3">
+            <a:schemeClr val="accent2"/>
+          </a:fillRef>
+          <a:effectRef idx="2">
+            <a:schemeClr val="accent2"/>
+          </a:effectRef>
+          <a:fontRef idx="minor">
+            <a:schemeClr val="lt1"/>
+          </a:fontRef>
+        </p:style>
+        <p:txBody>
+          <a:bodyPr rtlCol="0" anchor="ctr"/>
+          <a:lstStyle/>
+          <a:p>
+            <a:pPr algn="ctr"/>
+            <a:r>
+              <a:rPr lang="en-US" dirty="0"/>
+              <a:t>SECURITY – JWT/ OAUTH</a:t>
+            </a:r>
+          </a:p>
+        </p:txBody>
+      </p:sp>
+      <p:sp>
+        <p:nvSpPr>
+          <p:cNvPr id="30" name="Rectangle 29">
+            <a:extLst>
+              <a:ext uri="{FF2B5EF4-FFF2-40B4-BE49-F238E27FC236}">
+                <a16:creationId xmlns:a16="http://schemas.microsoft.com/office/drawing/2014/main" id="{715354C7-EEA2-A94B-7F44-B535009E6044}"/>
+              </a:ext>
+            </a:extLst>
+          </p:cNvPr>
+          <p:cNvSpPr/>
+          <p:nvPr/>
+        </p:nvSpPr>
+        <p:spPr>
+          <a:xfrm>
+            <a:off x="2137912" y="190640"/>
+            <a:ext cx="1349828" cy="1055916"/>
+          </a:xfrm>
+          <a:prstGeom prst="rect">
+            <a:avLst/>
+          </a:prstGeom>
+          <a:solidFill>
+            <a:schemeClr val="tx1"/>
+          </a:solidFill>
+        </p:spPr>
+        <p:style>
+          <a:lnRef idx="1">
+            <a:schemeClr val="accent2"/>
+          </a:lnRef>
+          <a:fillRef idx="3">
+            <a:schemeClr val="accent2"/>
+          </a:fillRef>
+          <a:effectRef idx="2">
+            <a:schemeClr val="accent2"/>
+          </a:effectRef>
+          <a:fontRef idx="minor">
+            <a:schemeClr val="lt1"/>
+          </a:fontRef>
+        </p:style>
+        <p:txBody>
+          <a:bodyPr rtlCol="0" anchor="ctr"/>
+          <a:lstStyle/>
+          <a:p>
+            <a:pPr algn="ctr"/>
+            <a:r>
+              <a:rPr lang="en-US" dirty="0"/>
+              <a:t>Monitoring tools</a:t>
+            </a:r>
+          </a:p>
+        </p:txBody>
+      </p:sp>
     </p:spTree>
     <p:extLst>
       <p:ext uri="{BB962C8B-B14F-4D97-AF65-F5344CB8AC3E}">
@@ -9530,6 +9676,198 @@
                                         <p:cTn id="266" dur="500"/>
                                         <p:tgtEl>
                                           <p:spTgt spid="64"/>
+                                        </p:tgtEl>
+                                      </p:cBhvr>
+                                    </p:animEffect>
+                                  </p:childTnLst>
+                                </p:cTn>
+                              </p:par>
+                              <p:par>
+                                <p:cTn id="267" presetID="12" presetClass="entr" presetSubtype="4" fill="hold" grpId="0" nodeType="withEffect">
+                                  <p:stCondLst>
+                                    <p:cond delay="0"/>
+                                  </p:stCondLst>
+                                  <p:childTnLst>
+                                    <p:set>
+                                      <p:cBhvr>
+                                        <p:cTn id="268" dur="1" fill="hold">
+                                          <p:stCondLst>
+                                            <p:cond delay="0"/>
+                                          </p:stCondLst>
+                                        </p:cTn>
+                                        <p:tgtEl>
+                                          <p:spTgt spid="3"/>
+                                        </p:tgtEl>
+                                        <p:attrNameLst>
+                                          <p:attrName>style.visibility</p:attrName>
+                                        </p:attrNameLst>
+                                      </p:cBhvr>
+                                      <p:to>
+                                        <p:strVal val="visible"/>
+                                      </p:to>
+                                    </p:set>
+                                    <p:anim calcmode="lin" valueType="num">
+                                      <p:cBhvr additive="base">
+                                        <p:cTn id="269" dur="500"/>
+                                        <p:tgtEl>
+                                          <p:spTgt spid="3"/>
+                                        </p:tgtEl>
+                                        <p:attrNameLst>
+                                          <p:attrName>ppt_y</p:attrName>
+                                        </p:attrNameLst>
+                                      </p:cBhvr>
+                                      <p:tavLst>
+                                        <p:tav tm="0">
+                                          <p:val>
+                                            <p:strVal val="#ppt_y+#ppt_h*1.125000"/>
+                                          </p:val>
+                                        </p:tav>
+                                        <p:tav tm="100000">
+                                          <p:val>
+                                            <p:strVal val="#ppt_y"/>
+                                          </p:val>
+                                        </p:tav>
+                                      </p:tavLst>
+                                    </p:anim>
+                                    <p:animEffect transition="in" filter="wipe(up)">
+                                      <p:cBhvr>
+                                        <p:cTn id="270" dur="500"/>
+                                        <p:tgtEl>
+                                          <p:spTgt spid="3"/>
+                                        </p:tgtEl>
+                                      </p:cBhvr>
+                                    </p:animEffect>
+                                  </p:childTnLst>
+                                </p:cTn>
+                              </p:par>
+                              <p:par>
+                                <p:cTn id="271" presetID="12" presetClass="entr" presetSubtype="4" fill="hold" grpId="0" nodeType="withEffect">
+                                  <p:stCondLst>
+                                    <p:cond delay="0"/>
+                                  </p:stCondLst>
+                                  <p:childTnLst>
+                                    <p:set>
+                                      <p:cBhvr>
+                                        <p:cTn id="272" dur="1" fill="hold">
+                                          <p:stCondLst>
+                                            <p:cond delay="0"/>
+                                          </p:stCondLst>
+                                        </p:cTn>
+                                        <p:tgtEl>
+                                          <p:spTgt spid="25"/>
+                                        </p:tgtEl>
+                                        <p:attrNameLst>
+                                          <p:attrName>style.visibility</p:attrName>
+                                        </p:attrNameLst>
+                                      </p:cBhvr>
+                                      <p:to>
+                                        <p:strVal val="visible"/>
+                                      </p:to>
+                                    </p:set>
+                                    <p:anim calcmode="lin" valueType="num">
+                                      <p:cBhvr additive="base">
+                                        <p:cTn id="273" dur="500"/>
+                                        <p:tgtEl>
+                                          <p:spTgt spid="25"/>
+                                        </p:tgtEl>
+                                        <p:attrNameLst>
+                                          <p:attrName>ppt_y</p:attrName>
+                                        </p:attrNameLst>
+                                      </p:cBhvr>
+                                      <p:tavLst>
+                                        <p:tav tm="0">
+                                          <p:val>
+                                            <p:strVal val="#ppt_y+#ppt_h*1.125000"/>
+                                          </p:val>
+                                        </p:tav>
+                                        <p:tav tm="100000">
+                                          <p:val>
+                                            <p:strVal val="#ppt_y"/>
+                                          </p:val>
+                                        </p:tav>
+                                      </p:tavLst>
+                                    </p:anim>
+                                    <p:animEffect transition="in" filter="wipe(up)">
+                                      <p:cBhvr>
+                                        <p:cTn id="274" dur="500"/>
+                                        <p:tgtEl>
+                                          <p:spTgt spid="25"/>
+                                        </p:tgtEl>
+                                      </p:cBhvr>
+                                    </p:animEffect>
+                                  </p:childTnLst>
+                                </p:cTn>
+                              </p:par>
+                            </p:childTnLst>
+                          </p:cTn>
+                        </p:par>
+                      </p:childTnLst>
+                    </p:cTn>
+                  </p:par>
+                  <p:par>
+                    <p:cTn id="275" fill="hold">
+                      <p:stCondLst>
+                        <p:cond delay="indefinite"/>
+                      </p:stCondLst>
+                      <p:childTnLst>
+                        <p:par>
+                          <p:cTn id="276" fill="hold">
+                            <p:stCondLst>
+                              <p:cond delay="0"/>
+                            </p:stCondLst>
+                            <p:childTnLst>
+                              <p:par>
+                                <p:cTn id="277" presetID="12" presetClass="entr" presetSubtype="4" fill="hold" grpId="0" nodeType="clickEffect">
+                                  <p:stCondLst>
+                                    <p:cond delay="0"/>
+                                  </p:stCondLst>
+                                  <p:childTnLst>
+                                    <p:set>
+                                      <p:cBhvr>
+                                        <p:cTn id="278" dur="1" fill="hold">
+                                          <p:stCondLst>
+                                            <p:cond delay="0"/>
+                                          </p:stCondLst>
+                                        </p:cTn>
+                                        <p:tgtEl>
+                                          <p:spTgt spid="30"/>
+                                        </p:tgtEl>
+                                        <p:attrNameLst>
+                                          <p:attrName>style.visibility</p:attrName>
+                                        </p:attrNameLst>
+                                      </p:cBhvr>
+                                      <p:to>
+                                        <p:strVal val="visible"/>
+                                      </p:to>
+                                    </p:set>
+                                    <p:anim calcmode="lin" valueType="num">
+                                      <p:cBhvr additive="base">
+                                        <p:cTn id="279" dur="500"/>
+                                        <p:tgtEl>
+                                          <p:spTgt spid="30"/>
+                                        </p:tgtEl>
+                                        <p:attrNameLst>
+                                          <p:attrName>ppt_y</p:attrName>
+                                        </p:attrNameLst>
+                                      </p:cBhvr>
+                                      <p:tavLst>
+                                        <p:tav tm="0">
+                                          <p:val>
+                                            <p:strVal val="#ppt_y+#ppt_h*1.125000"/>
+                                          </p:val>
+                                        </p:tav>
+                                        <p:tav tm="100000">
+                                          <p:val>
+                                            <p:strVal val="#ppt_y"/>
+                                          </p:val>
+                                        </p:tav>
+                                      </p:tavLst>
+                                    </p:anim>
+                                    <p:animEffect transition="in" filter="wipe(up)">
+                                      <p:cBhvr>
+                                        <p:cTn id="280" dur="500"/>
+                                        <p:tgtEl>
+                                          <p:spTgt spid="30"/>
                                         </p:tgtEl>
                                       </p:cBhvr>
                                     </p:animEffect>
@@ -9586,6 +9924,9 @@
       <p:bldP spid="23" grpId="0" animBg="1"/>
       <p:bldP spid="24" grpId="0" animBg="1"/>
       <p:bldP spid="77" grpId="0" animBg="1"/>
+      <p:bldP spid="3" grpId="0" animBg="1"/>
+      <p:bldP spid="25" grpId="0" animBg="1"/>
+      <p:bldP spid="30" grpId="0" animBg="1"/>
     </p:bldLst>
   </p:timing>
 </p:sld>

</xml_diff>